<commit_message>
Corrected slides 24 and 26 sequence
</commit_message>
<xml_diff>
--- a/images/Sequence/Sequence.pptx
+++ b/images/Sequence/Sequence.pptx
@@ -224,7 +224,7 @@
           <a:p>
             <a:fld id="{4520374D-A10D-4F16-A346-D54563820891}" type="datetimeFigureOut">
               <a:rPr lang="en-MY" smtClean="0"/>
-              <a:t>11/4/2020</a:t>
+              <a:t>18/10/2020</a:t>
             </a:fld>
             <a:endParaRPr lang="en-MY"/>
           </a:p>
@@ -662,7 +662,7 @@
           <a:p>
             <a:fld id="{48A87A34-81AB-432B-8DAE-1953F412C126}" type="datetimeFigureOut">
               <a:rPr lang="en-US" dirty="0"/>
-              <a:t>4/11/2020</a:t>
+              <a:t>10/18/2020</a:t>
             </a:fld>
             <a:endParaRPr lang="en-US" dirty="0"/>
           </a:p>
@@ -924,7 +924,7 @@
           <a:p>
             <a:fld id="{48A87A34-81AB-432B-8DAE-1953F412C126}" type="datetimeFigureOut">
               <a:rPr lang="en-US" dirty="0"/>
-              <a:t>4/11/2020</a:t>
+              <a:t>10/18/2020</a:t>
             </a:fld>
             <a:endParaRPr lang="en-US" dirty="0"/>
           </a:p>
@@ -1151,7 +1151,7 @@
             <a:fld id="{48A87A34-81AB-432B-8DAE-1953F412C126}" type="datetimeFigureOut">
               <a:rPr lang="en-US" dirty="0"/>
               <a:pPr/>
-              <a:t>4/11/2020</a:t>
+              <a:t>10/18/2020</a:t>
             </a:fld>
             <a:endParaRPr lang="en-US" dirty="0"/>
           </a:p>
@@ -1457,7 +1457,7 @@
             <a:fld id="{48A87A34-81AB-432B-8DAE-1953F412C126}" type="datetimeFigureOut">
               <a:rPr lang="en-US" dirty="0"/>
               <a:pPr/>
-              <a:t>4/11/2020</a:t>
+              <a:t>10/18/2020</a:t>
             </a:fld>
             <a:endParaRPr lang="en-US" dirty="0"/>
           </a:p>
@@ -1926,7 +1926,7 @@
             <a:fld id="{48A87A34-81AB-432B-8DAE-1953F412C126}" type="datetimeFigureOut">
               <a:rPr lang="en-US" dirty="0"/>
               <a:pPr/>
-              <a:t>4/11/2020</a:t>
+              <a:t>10/18/2020</a:t>
             </a:fld>
             <a:endParaRPr lang="en-US" dirty="0"/>
           </a:p>
@@ -2468,7 +2468,7 @@
           <a:p>
             <a:fld id="{48A87A34-81AB-432B-8DAE-1953F412C126}" type="datetimeFigureOut">
               <a:rPr lang="en-US" dirty="0"/>
-              <a:t>4/11/2020</a:t>
+              <a:t>10/18/2020</a:t>
             </a:fld>
             <a:endParaRPr lang="en-US" dirty="0"/>
           </a:p>
@@ -3237,7 +3237,7 @@
           <a:p>
             <a:fld id="{48A87A34-81AB-432B-8DAE-1953F412C126}" type="datetimeFigureOut">
               <a:rPr lang="en-US" dirty="0"/>
-              <a:t>4/11/2020</a:t>
+              <a:t>10/18/2020</a:t>
             </a:fld>
             <a:endParaRPr lang="en-US" dirty="0"/>
           </a:p>
@@ -3407,7 +3407,7 @@
           <a:p>
             <a:fld id="{48A87A34-81AB-432B-8DAE-1953F412C126}" type="datetimeFigureOut">
               <a:rPr lang="en-US" dirty="0"/>
-              <a:t>4/11/2020</a:t>
+              <a:t>10/18/2020</a:t>
             </a:fld>
             <a:endParaRPr lang="en-US" dirty="0"/>
           </a:p>
@@ -3626,7 +3626,7 @@
             <a:fld id="{48A87A34-81AB-432B-8DAE-1953F412C126}" type="datetimeFigureOut">
               <a:rPr lang="en-US" dirty="0"/>
               <a:pPr/>
-              <a:t>4/11/2020</a:t>
+              <a:t>10/18/2020</a:t>
             </a:fld>
             <a:endParaRPr lang="en-US" dirty="0"/>
           </a:p>
@@ -3862,7 +3862,7 @@
           <a:p>
             <a:fld id="{48A87A34-81AB-432B-8DAE-1953F412C126}" type="datetimeFigureOut">
               <a:rPr lang="en-US" smtClean="0"/>
-              <a:t>4/11/2020</a:t>
+              <a:t>10/18/2020</a:t>
             </a:fld>
             <a:endParaRPr lang="en-US" dirty="0"/>
           </a:p>
@@ -4042,7 +4042,7 @@
           <a:p>
             <a:fld id="{48A87A34-81AB-432B-8DAE-1953F412C126}" type="datetimeFigureOut">
               <a:rPr lang="en-US" smtClean="0"/>
-              <a:t>4/11/2020</a:t>
+              <a:t>10/18/2020</a:t>
             </a:fld>
             <a:endParaRPr lang="en-US" dirty="0"/>
           </a:p>
@@ -4212,7 +4212,7 @@
           <a:p>
             <a:fld id="{48A87A34-81AB-432B-8DAE-1953F412C126}" type="datetimeFigureOut">
               <a:rPr lang="en-US" dirty="0"/>
-              <a:t>4/11/2020</a:t>
+              <a:t>10/18/2020</a:t>
             </a:fld>
             <a:endParaRPr lang="en-US" dirty="0"/>
           </a:p>
@@ -4497,7 +4497,7 @@
             <a:fld id="{48A87A34-81AB-432B-8DAE-1953F412C126}" type="datetimeFigureOut">
               <a:rPr lang="en-US" smtClean="0"/>
               <a:pPr/>
-              <a:t>4/11/2020</a:t>
+              <a:t>10/18/2020</a:t>
             </a:fld>
             <a:endParaRPr lang="en-US" dirty="0"/>
           </a:p>
@@ -4739,7 +4739,7 @@
           <a:p>
             <a:fld id="{48A87A34-81AB-432B-8DAE-1953F412C126}" type="datetimeFigureOut">
               <a:rPr lang="en-US" smtClean="0"/>
-              <a:t>4/11/2020</a:t>
+              <a:t>10/18/2020</a:t>
             </a:fld>
             <a:endParaRPr lang="en-US" dirty="0"/>
           </a:p>
@@ -5118,7 +5118,7 @@
           <a:p>
             <a:fld id="{48A87A34-81AB-432B-8DAE-1953F412C126}" type="datetimeFigureOut">
               <a:rPr lang="en-US" smtClean="0"/>
-              <a:t>4/11/2020</a:t>
+              <a:t>10/18/2020</a:t>
             </a:fld>
             <a:endParaRPr lang="en-US" dirty="0"/>
           </a:p>
@@ -5236,7 +5236,7 @@
           <a:p>
             <a:fld id="{48A87A34-81AB-432B-8DAE-1953F412C126}" type="datetimeFigureOut">
               <a:rPr lang="en-US" smtClean="0"/>
-              <a:t>4/11/2020</a:t>
+              <a:t>10/18/2020</a:t>
             </a:fld>
             <a:endParaRPr lang="en-US" dirty="0"/>
           </a:p>
@@ -5331,7 +5331,7 @@
           <a:p>
             <a:fld id="{48A87A34-81AB-432B-8DAE-1953F412C126}" type="datetimeFigureOut">
               <a:rPr lang="en-US" smtClean="0"/>
-              <a:t>4/11/2020</a:t>
+              <a:t>10/18/2020</a:t>
             </a:fld>
             <a:endParaRPr lang="en-US" dirty="0"/>
           </a:p>
@@ -5580,7 +5580,7 @@
           <a:p>
             <a:fld id="{48A87A34-81AB-432B-8DAE-1953F412C126}" type="datetimeFigureOut">
               <a:rPr lang="en-US" smtClean="0"/>
-              <a:t>4/11/2020</a:t>
+              <a:t>10/18/2020</a:t>
             </a:fld>
             <a:endParaRPr lang="en-US" dirty="0"/>
           </a:p>
@@ -5837,7 +5837,7 @@
           <a:p>
             <a:fld id="{48A87A34-81AB-432B-8DAE-1953F412C126}" type="datetimeFigureOut">
               <a:rPr lang="en-US" smtClean="0"/>
-              <a:t>4/11/2020</a:t>
+              <a:t>10/18/2020</a:t>
             </a:fld>
             <a:endParaRPr lang="en-US" dirty="0"/>
           </a:p>
@@ -6094,7 +6094,7 @@
           <a:p>
             <a:fld id="{48A87A34-81AB-432B-8DAE-1953F412C126}" type="datetimeFigureOut">
               <a:rPr lang="en-US" smtClean="0"/>
-              <a:t>4/11/2020</a:t>
+              <a:t>10/18/2020</a:t>
             </a:fld>
             <a:endParaRPr lang="en-US" dirty="0"/>
           </a:p>
@@ -6326,7 +6326,7 @@
             <a:fld id="{48A87A34-81AB-432B-8DAE-1953F412C126}" type="datetimeFigureOut">
               <a:rPr lang="en-US" smtClean="0"/>
               <a:pPr/>
-              <a:t>4/11/2020</a:t>
+              <a:t>10/18/2020</a:t>
             </a:fld>
             <a:endParaRPr lang="en-US" dirty="0"/>
           </a:p>
@@ -6637,7 +6637,7 @@
             <a:fld id="{48A87A34-81AB-432B-8DAE-1953F412C126}" type="datetimeFigureOut">
               <a:rPr lang="en-US" smtClean="0"/>
               <a:pPr/>
-              <a:t>4/11/2020</a:t>
+              <a:t>10/18/2020</a:t>
             </a:fld>
             <a:endParaRPr lang="en-US" dirty="0"/>
           </a:p>
@@ -7169,7 +7169,7 @@
             <a:fld id="{48A87A34-81AB-432B-8DAE-1953F412C126}" type="datetimeFigureOut">
               <a:rPr lang="en-US" dirty="0"/>
               <a:pPr/>
-              <a:t>4/11/2020</a:t>
+              <a:t>10/18/2020</a:t>
             </a:fld>
             <a:endParaRPr lang="en-US" dirty="0"/>
           </a:p>
@@ -7406,7 +7406,7 @@
             <a:fld id="{48A87A34-81AB-432B-8DAE-1953F412C126}" type="datetimeFigureOut">
               <a:rPr lang="en-US" smtClean="0"/>
               <a:pPr/>
-              <a:t>4/11/2020</a:t>
+              <a:t>10/18/2020</a:t>
             </a:fld>
             <a:endParaRPr lang="en-US" dirty="0"/>
           </a:p>
@@ -7953,7 +7953,7 @@
           <a:p>
             <a:fld id="{48A87A34-81AB-432B-8DAE-1953F412C126}" type="datetimeFigureOut">
               <a:rPr lang="en-US" smtClean="0"/>
-              <a:t>4/11/2020</a:t>
+              <a:t>10/18/2020</a:t>
             </a:fld>
             <a:endParaRPr lang="en-US" dirty="0"/>
           </a:p>
@@ -8727,7 +8727,7 @@
           <a:p>
             <a:fld id="{48A87A34-81AB-432B-8DAE-1953F412C126}" type="datetimeFigureOut">
               <a:rPr lang="en-US" smtClean="0"/>
-              <a:t>4/11/2020</a:t>
+              <a:t>10/18/2020</a:t>
             </a:fld>
             <a:endParaRPr lang="en-US" dirty="0"/>
           </a:p>
@@ -8902,7 +8902,7 @@
           <a:p>
             <a:fld id="{48A87A34-81AB-432B-8DAE-1953F412C126}" type="datetimeFigureOut">
               <a:rPr lang="en-US" smtClean="0"/>
-              <a:t>4/11/2020</a:t>
+              <a:t>10/18/2020</a:t>
             </a:fld>
             <a:endParaRPr lang="en-US" dirty="0"/>
           </a:p>
@@ -9126,7 +9126,7 @@
             <a:fld id="{48A87A34-81AB-432B-8DAE-1953F412C126}" type="datetimeFigureOut">
               <a:rPr lang="en-US" smtClean="0"/>
               <a:pPr/>
-              <a:t>4/11/2020</a:t>
+              <a:t>10/18/2020</a:t>
             </a:fld>
             <a:endParaRPr lang="en-US" dirty="0"/>
           </a:p>
@@ -9368,7 +9368,7 @@
           <a:p>
             <a:fld id="{48A87A34-81AB-432B-8DAE-1953F412C126}" type="datetimeFigureOut">
               <a:rPr lang="en-US" dirty="0"/>
-              <a:t>4/11/2020</a:t>
+              <a:t>10/18/2020</a:t>
             </a:fld>
             <a:endParaRPr lang="en-US" dirty="0"/>
           </a:p>
@@ -9742,7 +9742,7 @@
           <a:p>
             <a:fld id="{48A87A34-81AB-432B-8DAE-1953F412C126}" type="datetimeFigureOut">
               <a:rPr lang="en-US" dirty="0"/>
-              <a:t>4/11/2020</a:t>
+              <a:t>10/18/2020</a:t>
             </a:fld>
             <a:endParaRPr lang="en-US" dirty="0"/>
           </a:p>
@@ -9855,7 +9855,7 @@
           <a:p>
             <a:fld id="{48A87A34-81AB-432B-8DAE-1953F412C126}" type="datetimeFigureOut">
               <a:rPr lang="en-US" dirty="0"/>
-              <a:t>4/11/2020</a:t>
+              <a:t>10/18/2020</a:t>
             </a:fld>
             <a:endParaRPr lang="en-US" dirty="0"/>
           </a:p>
@@ -9945,7 +9945,7 @@
           <a:p>
             <a:fld id="{48A87A34-81AB-432B-8DAE-1953F412C126}" type="datetimeFigureOut">
               <a:rPr lang="en-US" dirty="0"/>
-              <a:t>4/11/2020</a:t>
+              <a:t>10/18/2020</a:t>
             </a:fld>
             <a:endParaRPr lang="en-US" dirty="0"/>
           </a:p>
@@ -10189,7 +10189,7 @@
           <a:p>
             <a:fld id="{48A87A34-81AB-432B-8DAE-1953F412C126}" type="datetimeFigureOut">
               <a:rPr lang="en-US" dirty="0"/>
-              <a:t>4/11/2020</a:t>
+              <a:t>10/18/2020</a:t>
             </a:fld>
             <a:endParaRPr lang="en-US" dirty="0"/>
           </a:p>
@@ -10441,7 +10441,7 @@
           <a:p>
             <a:fld id="{48A87A34-81AB-432B-8DAE-1953F412C126}" type="datetimeFigureOut">
               <a:rPr lang="en-US" dirty="0"/>
-              <a:t>4/11/2020</a:t>
+              <a:t>10/18/2020</a:t>
             </a:fld>
             <a:endParaRPr lang="en-US" dirty="0"/>
           </a:p>
@@ -10684,7 +10684,7 @@
             <a:fld id="{48A87A34-81AB-432B-8DAE-1953F412C126}" type="datetimeFigureOut">
               <a:rPr lang="en-US" smtClean="0"/>
               <a:pPr/>
-              <a:t>4/11/2020</a:t>
+              <a:t>10/18/2020</a:t>
             </a:fld>
             <a:endParaRPr lang="en-US" dirty="0"/>
           </a:p>
@@ -11335,7 +11335,7 @@
             <a:fld id="{48A87A34-81AB-432B-8DAE-1953F412C126}" type="datetimeFigureOut">
               <a:rPr lang="en-US" smtClean="0"/>
               <a:pPr/>
-              <a:t>4/11/2020</a:t>
+              <a:t>10/18/2020</a:t>
             </a:fld>
             <a:endParaRPr lang="en-US" dirty="0"/>
           </a:p>
@@ -11627,7 +11627,7 @@
             <a:fld id="{48A87A34-81AB-432B-8DAE-1953F412C126}" type="datetimeFigureOut">
               <a:rPr lang="en-US" smtClean="0"/>
               <a:pPr/>
-              <a:t>4/11/2020</a:t>
+              <a:t>10/18/2020</a:t>
             </a:fld>
             <a:endParaRPr lang="en-US" dirty="0"/>
           </a:p>
@@ -12723,7 +12723,7 @@
           <a:graphicData uri="http://schemas.openxmlformats.org/presentationml/2006/ole">
             <mc:AlternateContent xmlns:mc="http://schemas.openxmlformats.org/markup-compatibility/2006">
               <mc:Choice xmlns:v="urn:schemas-microsoft-com:vml" Requires="v">
-                <p:oleObj spid="_x0000_s17414" name="Equation" r:id="rId3" imgW="1104840" imgH="1130040" progId="Equation.3">
+                <p:oleObj spid="_x0000_s17416" name="Equation" r:id="rId3" imgW="1104840" imgH="1130040" progId="Equation.3">
                   <p:embed/>
                 </p:oleObj>
               </mc:Choice>
@@ -12972,7 +12972,7 @@
           <a:graphicData uri="http://schemas.openxmlformats.org/presentationml/2006/ole">
             <mc:AlternateContent xmlns:mc="http://schemas.openxmlformats.org/markup-compatibility/2006">
               <mc:Choice xmlns:v="urn:schemas-microsoft-com:vml" Requires="v">
-                <p:oleObj spid="_x0000_s12298" name="Equation" r:id="rId3" imgW="1282680" imgH="393480" progId="Equation.3">
+                <p:oleObj spid="_x0000_s12300" name="Equation" r:id="rId3" imgW="1282680" imgH="393480" progId="Equation.3">
                   <p:embed/>
                 </p:oleObj>
               </mc:Choice>
@@ -13171,7 +13171,7 @@
           <a:graphicData uri="http://schemas.openxmlformats.org/presentationml/2006/ole">
             <mc:AlternateContent xmlns:mc="http://schemas.openxmlformats.org/markup-compatibility/2006">
               <mc:Choice xmlns:v="urn:schemas-microsoft-com:vml" Requires="v">
-                <p:oleObj spid="_x0000_s13330" name="Equation" r:id="rId3" imgW="1282680" imgH="393480" progId="Equation.3">
+                <p:oleObj spid="_x0000_s13334" name="Equation" r:id="rId3" imgW="1282680" imgH="393480" progId="Equation.3">
                   <p:embed/>
                 </p:oleObj>
               </mc:Choice>
@@ -13247,7 +13247,7 @@
           <a:graphicData uri="http://schemas.openxmlformats.org/presentationml/2006/ole">
             <mc:AlternateContent xmlns:mc="http://schemas.openxmlformats.org/markup-compatibility/2006">
               <mc:Choice xmlns:v="urn:schemas-microsoft-com:vml" Requires="v">
-                <p:oleObj spid="_x0000_s13331" name="Equation" r:id="rId5" imgW="1587240" imgH="1041120" progId="Equation.3">
+                <p:oleObj spid="_x0000_s13335" name="Equation" r:id="rId5" imgW="1587240" imgH="1041120" progId="Equation.3">
                   <p:embed/>
                 </p:oleObj>
               </mc:Choice>
@@ -13501,7 +13501,7 @@
           <a:graphicData uri="http://schemas.openxmlformats.org/presentationml/2006/ole">
             <mc:AlternateContent xmlns:mc="http://schemas.openxmlformats.org/markup-compatibility/2006">
               <mc:Choice xmlns:v="urn:schemas-microsoft-com:vml" Requires="v">
-                <p:oleObj spid="_x0000_s18438" name="Equation" r:id="rId3" imgW="2336760" imgH="1752480" progId="Equation.3">
+                <p:oleObj spid="_x0000_s18440" name="Equation" r:id="rId3" imgW="2336760" imgH="1752480" progId="Equation.3">
                   <p:embed/>
                 </p:oleObj>
               </mc:Choice>
@@ -14149,7 +14149,7 @@
           <a:graphicData uri="http://schemas.openxmlformats.org/presentationml/2006/ole">
             <mc:AlternateContent xmlns:mc="http://schemas.openxmlformats.org/markup-compatibility/2006">
               <mc:Choice xmlns:v="urn:schemas-microsoft-com:vml" Requires="v">
-                <p:oleObj spid="_x0000_s14345" name="Equation" r:id="rId3" imgW="622080" imgH="241200" progId="Equation.3">
+                <p:oleObj spid="_x0000_s14347" name="Equation" r:id="rId3" imgW="622080" imgH="241200" progId="Equation.3">
                   <p:embed/>
                 </p:oleObj>
               </mc:Choice>
@@ -14361,7 +14361,7 @@
           <a:graphicData uri="http://schemas.openxmlformats.org/presentationml/2006/ole">
             <mc:AlternateContent xmlns:mc="http://schemas.openxmlformats.org/markup-compatibility/2006">
               <mc:Choice xmlns:v="urn:schemas-microsoft-com:vml" Requires="v">
-                <p:oleObj spid="_x0000_s19461" name="Equation" r:id="rId3" imgW="774360" imgH="1676160" progId="Equation.3">
+                <p:oleObj spid="_x0000_s19463" name="Equation" r:id="rId3" imgW="774360" imgH="1676160" progId="Equation.3">
                   <p:embed/>
                 </p:oleObj>
               </mc:Choice>
@@ -14807,7 +14807,7 @@
           <a:graphicData uri="http://schemas.openxmlformats.org/presentationml/2006/ole">
             <mc:AlternateContent xmlns:mc="http://schemas.openxmlformats.org/markup-compatibility/2006">
               <mc:Choice xmlns:v="urn:schemas-microsoft-com:vml" Requires="v">
-                <p:oleObj spid="_x0000_s15370" name="Equation" r:id="rId3" imgW="1549080" imgH="838080" progId="Equation.3">
+                <p:oleObj spid="_x0000_s15372" name="Equation" r:id="rId3" imgW="1549080" imgH="838080" progId="Equation.3">
                   <p:embed/>
                 </p:oleObj>
               </mc:Choice>
@@ -15001,7 +15001,7 @@
           <a:graphicData uri="http://schemas.openxmlformats.org/presentationml/2006/ole">
             <mc:AlternateContent xmlns:mc="http://schemas.openxmlformats.org/markup-compatibility/2006">
               <mc:Choice xmlns:v="urn:schemas-microsoft-com:vml" Requires="v">
-                <p:oleObj spid="_x0000_s20484" name="Equation" r:id="rId3" imgW="876240" imgH="1193760" progId="Equation.3">
+                <p:oleObj spid="_x0000_s20486" name="Equation" r:id="rId3" imgW="876240" imgH="1193760" progId="Equation.3">
                   <p:embed/>
                 </p:oleObj>
               </mc:Choice>
@@ -15181,7 +15181,7 @@
           <a:graphicData uri="http://schemas.openxmlformats.org/presentationml/2006/ole">
             <mc:AlternateContent xmlns:mc="http://schemas.openxmlformats.org/markup-compatibility/2006">
               <mc:Choice xmlns:v="urn:schemas-microsoft-com:vml" Requires="v">
-                <p:oleObj spid="_x0000_s21507" name="Equation" r:id="rId3" imgW="1143000" imgH="1828800" progId="Equation.3">
+                <p:oleObj spid="_x0000_s21509" name="Equation" r:id="rId3" imgW="1143000" imgH="1828800" progId="Equation.3">
                   <p:embed/>
                 </p:oleObj>
               </mc:Choice>
@@ -15350,69 +15350,753 @@
           </a:p>
         </p:txBody>
       </p:sp>
-      <p:graphicFrame>
-        <p:nvGraphicFramePr>
-          <p:cNvPr id="4" name="Object 3">
-            <a:extLst>
-              <a:ext uri="{FF2B5EF4-FFF2-40B4-BE49-F238E27FC236}">
-                <a16:creationId xmlns:a16="http://schemas.microsoft.com/office/drawing/2014/main" id="{D44016CE-DC1B-47E7-9640-79F63DD941DC}"/>
-              </a:ext>
-            </a:extLst>
-          </p:cNvPr>
-          <p:cNvGraphicFramePr>
-            <a:graphicFrameLocks noChangeAspect="1"/>
-          </p:cNvGraphicFramePr>
-          <p:nvPr>
-            <p:extLst>
-              <p:ext uri="{D42A27DB-BD31-4B8C-83A1-F6EECF244321}">
-                <p14:modId xmlns:p14="http://schemas.microsoft.com/office/powerpoint/2010/main" val="1588831538"/>
-              </p:ext>
-            </p:extLst>
-          </p:nvPr>
-        </p:nvGraphicFramePr>
-        <p:xfrm>
-          <a:off x="7753145" y="2191758"/>
-          <a:ext cx="2012645" cy="3982919"/>
-        </p:xfrm>
-        <a:graphic>
-          <a:graphicData uri="http://schemas.openxmlformats.org/presentationml/2006/ole">
-            <mc:AlternateContent xmlns:mc="http://schemas.openxmlformats.org/markup-compatibility/2006">
-              <mc:Choice xmlns:v="urn:schemas-microsoft-com:vml" Requires="v">
-                <p:oleObj spid="_x0000_s22532" name="Equation" r:id="rId3" imgW="1206360" imgH="2387520" progId="Equation.3">
-                  <p:embed/>
-                </p:oleObj>
-              </mc:Choice>
-              <mc:Fallback>
-                <p:oleObj name="Equation" r:id="rId3" imgW="1206360" imgH="2387520" progId="Equation.3">
-                  <p:embed/>
-                  <p:pic>
-                    <p:nvPicPr>
-                      <p:cNvPr id="0" name=""/>
-                      <p:cNvPicPr/>
-                      <p:nvPr/>
-                    </p:nvPicPr>
-                    <p:blipFill>
-                      <a:blip r:embed="rId4"/>
-                      <a:stretch>
-                        <a:fillRect/>
-                      </a:stretch>
-                    </p:blipFill>
-                    <p:spPr>
-                      <a:xfrm>
-                        <a:off x="7753145" y="2191758"/>
-                        <a:ext cx="2012645" cy="3982919"/>
-                      </a:xfrm>
-                      <a:prstGeom prst="rect">
-                        <a:avLst/>
-                      </a:prstGeom>
-                    </p:spPr>
-                  </p:pic>
-                </p:oleObj>
-              </mc:Fallback>
-            </mc:AlternateContent>
-          </a:graphicData>
-        </a:graphic>
-      </p:graphicFrame>
+      <mc:AlternateContent xmlns:mc="http://schemas.openxmlformats.org/markup-compatibility/2006">
+        <mc:Choice xmlns:a14="http://schemas.microsoft.com/office/drawing/2010/main" Requires="a14">
+          <p:sp>
+            <p:nvSpPr>
+              <p:cNvPr id="4" name="Object 3">
+                <a:extLst>
+                  <a:ext uri="{FF2B5EF4-FFF2-40B4-BE49-F238E27FC236}">
+                    <a16:creationId xmlns:a16="http://schemas.microsoft.com/office/drawing/2014/main" id="{D44016CE-DC1B-47E7-9640-79F63DD941DC}"/>
+                  </a:ext>
+                </a:extLst>
+              </p:cNvPr>
+              <p:cNvSpPr txBox="1"/>
+              <p:nvPr/>
+            </p:nvSpPr>
+            <p:spPr>
+              <a:xfrm>
+                <a:off x="7753350" y="2192338"/>
+                <a:ext cx="3095092" cy="3983037"/>
+              </a:xfrm>
+              <a:prstGeom prst="rect">
+                <a:avLst/>
+              </a:prstGeom>
+            </p:spPr>
+            <p:txBody>
+              <a:bodyPr>
+                <a:normAutofit/>
+              </a:bodyPr>
+              <a:lstStyle/>
+              <a:p>
+                <a:pPr/>
+                <a14:m>
+                  <m:oMathPara xmlns:m="http://schemas.openxmlformats.org/officeDocument/2006/math">
+                    <m:oMathParaPr>
+                      <m:jc m:val="left"/>
+                    </m:oMathParaPr>
+                    <m:oMath xmlns:m="http://schemas.openxmlformats.org/officeDocument/2006/math">
+                      <m:sSub>
+                        <m:sSubPr>
+                          <m:ctrlPr>
+                            <a:rPr lang="en-MY" i="1" smtClean="0">
+                              <a:solidFill>
+                                <a:srgbClr val="000000"/>
+                              </a:solidFill>
+                              <a:latin typeface="Cambria Math" panose="02040503050406030204" pitchFamily="18" charset="0"/>
+                            </a:rPr>
+                          </m:ctrlPr>
+                        </m:sSubPr>
+                        <m:e>
+                          <m:r>
+                            <a:rPr lang="en-MY" i="1">
+                              <a:solidFill>
+                                <a:srgbClr val="000000"/>
+                              </a:solidFill>
+                              <a:latin typeface="Cambria Math" panose="02040503050406030204" pitchFamily="18" charset="0"/>
+                            </a:rPr>
+                            <m:t>𝑆</m:t>
+                          </m:r>
+                        </m:e>
+                        <m:sub>
+                          <m:r>
+                            <a:rPr lang="en-MY" i="1">
+                              <a:solidFill>
+                                <a:srgbClr val="000000"/>
+                              </a:solidFill>
+                              <a:latin typeface="Cambria Math" panose="02040503050406030204" pitchFamily="18" charset="0"/>
+                            </a:rPr>
+                            <m:t>𝑛</m:t>
+                          </m:r>
+                        </m:sub>
+                      </m:sSub>
+                      <m:r>
+                        <m:rPr>
+                          <m:aln/>
+                        </m:rPr>
+                        <a:rPr lang="en-MY" i="1">
+                          <a:solidFill>
+                            <a:srgbClr val="000000"/>
+                          </a:solidFill>
+                          <a:latin typeface="Cambria Math" panose="02040503050406030204" pitchFamily="18" charset="0"/>
+                        </a:rPr>
+                        <m:t>&gt;</m:t>
+                      </m:r>
+                      <m:r>
+                        <a:rPr lang="en-MY" i="1">
+                          <a:solidFill>
+                            <a:srgbClr val="000000"/>
+                          </a:solidFill>
+                          <a:latin typeface="Cambria Math" panose="02040503050406030204" pitchFamily="18" charset="0"/>
+                        </a:rPr>
+                        <m:t>20</m:t>
+                      </m:r>
+                    </m:oMath>
+                    <m:oMath xmlns:m="http://schemas.openxmlformats.org/officeDocument/2006/math">
+                      <m:r>
+                        <a:rPr lang="en-MY" i="1">
+                          <a:solidFill>
+                            <a:srgbClr val="000000"/>
+                          </a:solidFill>
+                          <a:latin typeface="Cambria Math" panose="02040503050406030204" pitchFamily="18" charset="0"/>
+                        </a:rPr>
+                        <m:t>𝑎</m:t>
+                      </m:r>
+                      <m:d>
+                        <m:dPr>
+                          <m:ctrlPr>
+                            <a:rPr lang="en-MY" i="1">
+                              <a:solidFill>
+                                <a:srgbClr val="000000"/>
+                              </a:solidFill>
+                              <a:latin typeface="Cambria Math" panose="02040503050406030204" pitchFamily="18" charset="0"/>
+                            </a:rPr>
+                          </m:ctrlPr>
+                        </m:dPr>
+                        <m:e>
+                          <m:f>
+                            <m:fPr>
+                              <m:ctrlPr>
+                                <a:rPr lang="en-MY" i="1">
+                                  <a:solidFill>
+                                    <a:srgbClr val="000000"/>
+                                  </a:solidFill>
+                                  <a:latin typeface="Cambria Math" panose="02040503050406030204" pitchFamily="18" charset="0"/>
+                                </a:rPr>
+                              </m:ctrlPr>
+                            </m:fPr>
+                            <m:num>
+                              <m:sSup>
+                                <m:sSupPr>
+                                  <m:ctrlPr>
+                                    <a:rPr lang="en-MY" i="1">
+                                      <a:solidFill>
+                                        <a:srgbClr val="000000"/>
+                                      </a:solidFill>
+                                      <a:latin typeface="Cambria Math" panose="02040503050406030204" pitchFamily="18" charset="0"/>
+                                    </a:rPr>
+                                  </m:ctrlPr>
+                                </m:sSupPr>
+                                <m:e>
+                                  <m:r>
+                                    <a:rPr lang="en-MY" i="1">
+                                      <a:solidFill>
+                                        <a:srgbClr val="000000"/>
+                                      </a:solidFill>
+                                      <a:latin typeface="Cambria Math" panose="02040503050406030204" pitchFamily="18" charset="0"/>
+                                    </a:rPr>
+                                    <m:t>𝑟</m:t>
+                                  </m:r>
+                                </m:e>
+                                <m:sup>
+                                  <m:r>
+                                    <a:rPr lang="en-MY" i="1">
+                                      <a:solidFill>
+                                        <a:srgbClr val="000000"/>
+                                      </a:solidFill>
+                                      <a:latin typeface="Cambria Math" panose="02040503050406030204" pitchFamily="18" charset="0"/>
+                                    </a:rPr>
+                                    <m:t>𝑛</m:t>
+                                  </m:r>
+                                </m:sup>
+                              </m:sSup>
+                              <m:r>
+                                <a:rPr lang="en-MY" i="1">
+                                  <a:solidFill>
+                                    <a:srgbClr val="000000"/>
+                                  </a:solidFill>
+                                  <a:latin typeface="Cambria Math" panose="02040503050406030204" pitchFamily="18" charset="0"/>
+                                </a:rPr>
+                                <m:t>−1</m:t>
+                              </m:r>
+                            </m:num>
+                            <m:den>
+                              <m:r>
+                                <a:rPr lang="en-MY" i="1">
+                                  <a:solidFill>
+                                    <a:srgbClr val="000000"/>
+                                  </a:solidFill>
+                                  <a:latin typeface="Cambria Math" panose="02040503050406030204" pitchFamily="18" charset="0"/>
+                                </a:rPr>
+                                <m:t>𝑟</m:t>
+                              </m:r>
+                              <m:r>
+                                <a:rPr lang="en-MY" i="1">
+                                  <a:solidFill>
+                                    <a:srgbClr val="000000"/>
+                                  </a:solidFill>
+                                  <a:latin typeface="Cambria Math" panose="02040503050406030204" pitchFamily="18" charset="0"/>
+                                </a:rPr>
+                                <m:t>−1</m:t>
+                              </m:r>
+                            </m:den>
+                          </m:f>
+                        </m:e>
+                      </m:d>
+                      <m:r>
+                        <m:rPr>
+                          <m:aln/>
+                        </m:rPr>
+                        <a:rPr lang="en-MY" i="1">
+                          <a:solidFill>
+                            <a:srgbClr val="000000"/>
+                          </a:solidFill>
+                          <a:latin typeface="Cambria Math" panose="02040503050406030204" pitchFamily="18" charset="0"/>
+                        </a:rPr>
+                        <m:t>&gt;</m:t>
+                      </m:r>
+                      <m:r>
+                        <a:rPr lang="en-MY" i="1">
+                          <a:solidFill>
+                            <a:srgbClr val="000000"/>
+                          </a:solidFill>
+                          <a:latin typeface="Cambria Math" panose="02040503050406030204" pitchFamily="18" charset="0"/>
+                        </a:rPr>
+                        <m:t>20</m:t>
+                      </m:r>
+                    </m:oMath>
+                    <m:oMath xmlns:m="http://schemas.openxmlformats.org/officeDocument/2006/math">
+                      <m:r>
+                        <a:rPr lang="en-MY" i="1">
+                          <a:solidFill>
+                            <a:srgbClr val="000000"/>
+                          </a:solidFill>
+                          <a:latin typeface="Cambria Math" panose="02040503050406030204" pitchFamily="18" charset="0"/>
+                        </a:rPr>
+                        <m:t>1</m:t>
+                      </m:r>
+                      <m:d>
+                        <m:dPr>
+                          <m:ctrlPr>
+                            <a:rPr lang="en-MY" i="1">
+                              <a:solidFill>
+                                <a:srgbClr val="000000"/>
+                              </a:solidFill>
+                              <a:latin typeface="Cambria Math" panose="02040503050406030204" pitchFamily="18" charset="0"/>
+                            </a:rPr>
+                          </m:ctrlPr>
+                        </m:dPr>
+                        <m:e>
+                          <m:f>
+                            <m:fPr>
+                              <m:ctrlPr>
+                                <a:rPr lang="en-MY" i="1">
+                                  <a:solidFill>
+                                    <a:srgbClr val="000000"/>
+                                  </a:solidFill>
+                                  <a:latin typeface="Cambria Math" panose="02040503050406030204" pitchFamily="18" charset="0"/>
+                                </a:rPr>
+                              </m:ctrlPr>
+                            </m:fPr>
+                            <m:num>
+                              <m:r>
+                                <a:rPr lang="en-MY" i="1">
+                                  <a:solidFill>
+                                    <a:srgbClr val="000000"/>
+                                  </a:solidFill>
+                                  <a:latin typeface="Cambria Math" panose="02040503050406030204" pitchFamily="18" charset="0"/>
+                                </a:rPr>
+                                <m:t>1.</m:t>
+                              </m:r>
+                              <m:sSup>
+                                <m:sSupPr>
+                                  <m:ctrlPr>
+                                    <a:rPr lang="en-MY" i="1">
+                                      <a:solidFill>
+                                        <a:srgbClr val="000000"/>
+                                      </a:solidFill>
+                                      <a:latin typeface="Cambria Math" panose="02040503050406030204" pitchFamily="18" charset="0"/>
+                                    </a:rPr>
+                                  </m:ctrlPr>
+                                </m:sSupPr>
+                                <m:e>
+                                  <m:r>
+                                    <a:rPr lang="en-MY" i="1">
+                                      <a:solidFill>
+                                        <a:srgbClr val="000000"/>
+                                      </a:solidFill>
+                                      <a:latin typeface="Cambria Math" panose="02040503050406030204" pitchFamily="18" charset="0"/>
+                                    </a:rPr>
+                                    <m:t>1</m:t>
+                                  </m:r>
+                                </m:e>
+                                <m:sup>
+                                  <m:r>
+                                    <a:rPr lang="en-MY" i="1">
+                                      <a:solidFill>
+                                        <a:srgbClr val="000000"/>
+                                      </a:solidFill>
+                                      <a:latin typeface="Cambria Math" panose="02040503050406030204" pitchFamily="18" charset="0"/>
+                                    </a:rPr>
+                                    <m:t>𝑛</m:t>
+                                  </m:r>
+                                </m:sup>
+                              </m:sSup>
+                              <m:r>
+                                <a:rPr lang="en-MY" i="1">
+                                  <a:solidFill>
+                                    <a:srgbClr val="000000"/>
+                                  </a:solidFill>
+                                  <a:latin typeface="Cambria Math" panose="02040503050406030204" pitchFamily="18" charset="0"/>
+                                </a:rPr>
+                                <m:t>−1</m:t>
+                              </m:r>
+                            </m:num>
+                            <m:den>
+                              <m:r>
+                                <a:rPr lang="en-MY" i="1">
+                                  <a:solidFill>
+                                    <a:srgbClr val="000000"/>
+                                  </a:solidFill>
+                                  <a:latin typeface="Cambria Math" panose="02040503050406030204" pitchFamily="18" charset="0"/>
+                                </a:rPr>
+                                <m:t>1.1−1</m:t>
+                              </m:r>
+                            </m:den>
+                          </m:f>
+                        </m:e>
+                      </m:d>
+                      <m:r>
+                        <m:rPr>
+                          <m:aln/>
+                        </m:rPr>
+                        <a:rPr lang="en-MY" i="1">
+                          <a:solidFill>
+                            <a:srgbClr val="000000"/>
+                          </a:solidFill>
+                          <a:latin typeface="Cambria Math" panose="02040503050406030204" pitchFamily="18" charset="0"/>
+                        </a:rPr>
+                        <m:t>&gt;</m:t>
+                      </m:r>
+                      <m:r>
+                        <a:rPr lang="en-MY" i="1">
+                          <a:solidFill>
+                            <a:srgbClr val="000000"/>
+                          </a:solidFill>
+                          <a:latin typeface="Cambria Math" panose="02040503050406030204" pitchFamily="18" charset="0"/>
+                        </a:rPr>
+                        <m:t>20</m:t>
+                      </m:r>
+                    </m:oMath>
+                    <m:oMath xmlns:m="http://schemas.openxmlformats.org/officeDocument/2006/math">
+                      <m:r>
+                        <a:rPr lang="en-MY" i="1">
+                          <a:solidFill>
+                            <a:srgbClr val="000000"/>
+                          </a:solidFill>
+                          <a:latin typeface="Cambria Math" panose="02040503050406030204" pitchFamily="18" charset="0"/>
+                        </a:rPr>
+                        <m:t>1.</m:t>
+                      </m:r>
+                      <m:sSup>
+                        <m:sSupPr>
+                          <m:ctrlPr>
+                            <a:rPr lang="en-MY" i="1">
+                              <a:solidFill>
+                                <a:srgbClr val="000000"/>
+                              </a:solidFill>
+                              <a:latin typeface="Cambria Math" panose="02040503050406030204" pitchFamily="18" charset="0"/>
+                            </a:rPr>
+                          </m:ctrlPr>
+                        </m:sSupPr>
+                        <m:e>
+                          <m:r>
+                            <a:rPr lang="en-MY" i="1">
+                              <a:solidFill>
+                                <a:srgbClr val="000000"/>
+                              </a:solidFill>
+                              <a:latin typeface="Cambria Math" panose="02040503050406030204" pitchFamily="18" charset="0"/>
+                            </a:rPr>
+                            <m:t>1</m:t>
+                          </m:r>
+                        </m:e>
+                        <m:sup>
+                          <m:r>
+                            <a:rPr lang="en-MY" i="1">
+                              <a:solidFill>
+                                <a:srgbClr val="000000"/>
+                              </a:solidFill>
+                              <a:latin typeface="Cambria Math" panose="02040503050406030204" pitchFamily="18" charset="0"/>
+                            </a:rPr>
+                            <m:t>𝑛</m:t>
+                          </m:r>
+                        </m:sup>
+                      </m:sSup>
+                      <m:r>
+                        <a:rPr lang="en-MY" i="1">
+                          <a:solidFill>
+                            <a:srgbClr val="000000"/>
+                          </a:solidFill>
+                          <a:latin typeface="Cambria Math" panose="02040503050406030204" pitchFamily="18" charset="0"/>
+                        </a:rPr>
+                        <m:t>−1</m:t>
+                      </m:r>
+                      <m:r>
+                        <m:rPr>
+                          <m:aln/>
+                        </m:rPr>
+                        <a:rPr lang="en-MY" i="1">
+                          <a:solidFill>
+                            <a:srgbClr val="000000"/>
+                          </a:solidFill>
+                          <a:latin typeface="Cambria Math" panose="02040503050406030204" pitchFamily="18" charset="0"/>
+                        </a:rPr>
+                        <m:t>&gt;</m:t>
+                      </m:r>
+                      <m:r>
+                        <a:rPr lang="en-MY" i="1">
+                          <a:solidFill>
+                            <a:srgbClr val="000000"/>
+                          </a:solidFill>
+                          <a:latin typeface="Cambria Math" panose="02040503050406030204" pitchFamily="18" charset="0"/>
+                        </a:rPr>
+                        <m:t>20</m:t>
+                      </m:r>
+                      <m:d>
+                        <m:dPr>
+                          <m:ctrlPr>
+                            <a:rPr lang="en-MY" i="1">
+                              <a:solidFill>
+                                <a:srgbClr val="000000"/>
+                              </a:solidFill>
+                              <a:latin typeface="Cambria Math" panose="02040503050406030204" pitchFamily="18" charset="0"/>
+                            </a:rPr>
+                          </m:ctrlPr>
+                        </m:dPr>
+                        <m:e>
+                          <m:r>
+                            <a:rPr lang="en-MY" i="1">
+                              <a:solidFill>
+                                <a:srgbClr val="000000"/>
+                              </a:solidFill>
+                              <a:latin typeface="Cambria Math" panose="02040503050406030204" pitchFamily="18" charset="0"/>
+                            </a:rPr>
+                            <m:t>0.1</m:t>
+                          </m:r>
+                        </m:e>
+                      </m:d>
+                    </m:oMath>
+                    <m:oMath xmlns:m="http://schemas.openxmlformats.org/officeDocument/2006/math">
+                      <m:r>
+                        <a:rPr lang="en-MY" i="1">
+                          <a:solidFill>
+                            <a:srgbClr val="000000"/>
+                          </a:solidFill>
+                          <a:latin typeface="Cambria Math" panose="02040503050406030204" pitchFamily="18" charset="0"/>
+                        </a:rPr>
+                        <m:t>1.</m:t>
+                      </m:r>
+                      <m:sSup>
+                        <m:sSupPr>
+                          <m:ctrlPr>
+                            <a:rPr lang="en-MY" i="1">
+                              <a:solidFill>
+                                <a:srgbClr val="000000"/>
+                              </a:solidFill>
+                              <a:latin typeface="Cambria Math" panose="02040503050406030204" pitchFamily="18" charset="0"/>
+                            </a:rPr>
+                          </m:ctrlPr>
+                        </m:sSupPr>
+                        <m:e>
+                          <m:r>
+                            <a:rPr lang="en-MY" i="1">
+                              <a:solidFill>
+                                <a:srgbClr val="000000"/>
+                              </a:solidFill>
+                              <a:latin typeface="Cambria Math" panose="02040503050406030204" pitchFamily="18" charset="0"/>
+                            </a:rPr>
+                            <m:t>1</m:t>
+                          </m:r>
+                        </m:e>
+                        <m:sup>
+                          <m:r>
+                            <a:rPr lang="en-MY" i="1">
+                              <a:solidFill>
+                                <a:srgbClr val="000000"/>
+                              </a:solidFill>
+                              <a:latin typeface="Cambria Math" panose="02040503050406030204" pitchFamily="18" charset="0"/>
+                            </a:rPr>
+                            <m:t>𝑛</m:t>
+                          </m:r>
+                        </m:sup>
+                      </m:sSup>
+                      <m:r>
+                        <m:rPr>
+                          <m:aln/>
+                        </m:rPr>
+                        <a:rPr lang="en-MY" i="1">
+                          <a:solidFill>
+                            <a:srgbClr val="000000"/>
+                          </a:solidFill>
+                          <a:latin typeface="Cambria Math" panose="02040503050406030204" pitchFamily="18" charset="0"/>
+                        </a:rPr>
+                        <m:t>&gt;</m:t>
+                      </m:r>
+                      <m:r>
+                        <a:rPr lang="en-MY" b="0" i="1" smtClean="0">
+                          <a:solidFill>
+                            <a:srgbClr val="000000"/>
+                          </a:solidFill>
+                          <a:latin typeface="Cambria Math" panose="02040503050406030204" pitchFamily="18" charset="0"/>
+                        </a:rPr>
+                        <m:t>3</m:t>
+                      </m:r>
+                    </m:oMath>
+                    <m:oMath xmlns:m="http://schemas.openxmlformats.org/officeDocument/2006/math">
+                      <m:r>
+                        <a:rPr lang="en-MY" i="1">
+                          <a:solidFill>
+                            <a:srgbClr val="000000"/>
+                          </a:solidFill>
+                          <a:latin typeface="Cambria Math" panose="02040503050406030204" pitchFamily="18" charset="0"/>
+                        </a:rPr>
+                        <m:t>𝑛</m:t>
+                      </m:r>
+                      <m:func>
+                        <m:funcPr>
+                          <m:ctrlPr>
+                            <a:rPr lang="en-MY" i="1">
+                              <a:solidFill>
+                                <a:srgbClr val="000000"/>
+                              </a:solidFill>
+                              <a:latin typeface="Cambria Math" panose="02040503050406030204" pitchFamily="18" charset="0"/>
+                            </a:rPr>
+                          </m:ctrlPr>
+                        </m:funcPr>
+                        <m:fName>
+                          <m:r>
+                            <m:rPr>
+                              <m:sty m:val="p"/>
+                            </m:rPr>
+                            <a:rPr lang="en-MY" i="0">
+                              <a:solidFill>
+                                <a:srgbClr val="000000"/>
+                              </a:solidFill>
+                              <a:latin typeface="Cambria Math" panose="02040503050406030204" pitchFamily="18" charset="0"/>
+                            </a:rPr>
+                            <m:t>log</m:t>
+                          </m:r>
+                        </m:fName>
+                        <m:e>
+                          <m:d>
+                            <m:dPr>
+                              <m:ctrlPr>
+                                <a:rPr lang="en-MY" i="1">
+                                  <a:solidFill>
+                                    <a:srgbClr val="000000"/>
+                                  </a:solidFill>
+                                  <a:latin typeface="Cambria Math" panose="02040503050406030204" pitchFamily="18" charset="0"/>
+                                </a:rPr>
+                              </m:ctrlPr>
+                            </m:dPr>
+                            <m:e>
+                              <m:r>
+                                <a:rPr lang="en-MY" i="1">
+                                  <a:solidFill>
+                                    <a:srgbClr val="000000"/>
+                                  </a:solidFill>
+                                  <a:latin typeface="Cambria Math" panose="02040503050406030204" pitchFamily="18" charset="0"/>
+                                </a:rPr>
+                                <m:t>1.1</m:t>
+                              </m:r>
+                            </m:e>
+                          </m:d>
+                        </m:e>
+                      </m:func>
+                      <m:r>
+                        <m:rPr>
+                          <m:aln/>
+                        </m:rPr>
+                        <a:rPr lang="en-MY" i="1">
+                          <a:solidFill>
+                            <a:srgbClr val="000000"/>
+                          </a:solidFill>
+                          <a:latin typeface="Cambria Math" panose="02040503050406030204" pitchFamily="18" charset="0"/>
+                        </a:rPr>
+                        <m:t>&gt;</m:t>
+                      </m:r>
+                      <m:func>
+                        <m:funcPr>
+                          <m:ctrlPr>
+                            <a:rPr lang="en-MY" i="1">
+                              <a:solidFill>
+                                <a:srgbClr val="000000"/>
+                              </a:solidFill>
+                              <a:latin typeface="Cambria Math" panose="02040503050406030204" pitchFamily="18" charset="0"/>
+                            </a:rPr>
+                          </m:ctrlPr>
+                        </m:funcPr>
+                        <m:fName>
+                          <m:r>
+                            <m:rPr>
+                              <m:sty m:val="p"/>
+                            </m:rPr>
+                            <a:rPr lang="en-MY" i="0">
+                              <a:solidFill>
+                                <a:srgbClr val="000000"/>
+                              </a:solidFill>
+                              <a:latin typeface="Cambria Math" panose="02040503050406030204" pitchFamily="18" charset="0"/>
+                            </a:rPr>
+                            <m:t>log</m:t>
+                          </m:r>
+                        </m:fName>
+                        <m:e>
+                          <m:r>
+                            <a:rPr lang="en-MY" b="0" i="1" smtClean="0">
+                              <a:solidFill>
+                                <a:srgbClr val="000000"/>
+                              </a:solidFill>
+                              <a:latin typeface="Cambria Math" panose="02040503050406030204" pitchFamily="18" charset="0"/>
+                            </a:rPr>
+                            <m:t>3</m:t>
+                          </m:r>
+                        </m:e>
+                      </m:func>
+                    </m:oMath>
+                    <m:oMath xmlns:m="http://schemas.openxmlformats.org/officeDocument/2006/math">
+                      <m:r>
+                        <a:rPr lang="en-MY" i="1">
+                          <a:solidFill>
+                            <a:srgbClr val="000000"/>
+                          </a:solidFill>
+                          <a:latin typeface="Cambria Math" panose="02040503050406030204" pitchFamily="18" charset="0"/>
+                        </a:rPr>
+                        <m:t>𝑛</m:t>
+                      </m:r>
+                      <m:r>
+                        <m:rPr>
+                          <m:aln/>
+                        </m:rPr>
+                        <a:rPr lang="en-MY" i="1">
+                          <a:solidFill>
+                            <a:srgbClr val="000000"/>
+                          </a:solidFill>
+                          <a:latin typeface="Cambria Math" panose="02040503050406030204" pitchFamily="18" charset="0"/>
+                        </a:rPr>
+                        <m:t>&gt;</m:t>
+                      </m:r>
+                      <m:r>
+                        <a:rPr lang="en-MY" b="0" i="1" smtClean="0">
+                          <a:solidFill>
+                            <a:srgbClr val="000000"/>
+                          </a:solidFill>
+                          <a:latin typeface="Cambria Math" panose="02040503050406030204" pitchFamily="18" charset="0"/>
+                        </a:rPr>
+                        <m:t>11.527</m:t>
+                      </m:r>
+                    </m:oMath>
+                    <m:oMath xmlns:m="http://schemas.openxmlformats.org/officeDocument/2006/math">
+                      <m:r>
+                        <a:rPr lang="en-MY" i="1">
+                          <a:solidFill>
+                            <a:srgbClr val="000000"/>
+                          </a:solidFill>
+                          <a:latin typeface="Cambria Math" panose="02040503050406030204" pitchFamily="18" charset="0"/>
+                        </a:rPr>
+                        <m:t>𝑇h𝑢𝑠</m:t>
+                      </m:r>
+                      <m:r>
+                        <a:rPr lang="en-MY" i="1">
+                          <a:solidFill>
+                            <a:srgbClr val="000000"/>
+                          </a:solidFill>
+                          <a:latin typeface="Cambria Math" panose="02040503050406030204" pitchFamily="18" charset="0"/>
+                        </a:rPr>
+                        <m:t>,</m:t>
+                      </m:r>
+                      <m:r>
+                        <a:rPr lang="en-MY" i="1">
+                          <a:solidFill>
+                            <a:srgbClr val="000000"/>
+                          </a:solidFill>
+                          <a:latin typeface="Cambria Math" panose="02040503050406030204" pitchFamily="18" charset="0"/>
+                        </a:rPr>
+                        <m:t>𝑛</m:t>
+                      </m:r>
+                      <m:r>
+                        <m:rPr>
+                          <m:aln/>
+                        </m:rPr>
+                        <a:rPr lang="en-MY" i="1">
+                          <a:solidFill>
+                            <a:srgbClr val="000000"/>
+                          </a:solidFill>
+                          <a:latin typeface="Cambria Math" panose="02040503050406030204" pitchFamily="18" charset="0"/>
+                        </a:rPr>
+                        <m:t>=</m:t>
+                      </m:r>
+                      <m:r>
+                        <a:rPr lang="en-MY" b="0" i="1" smtClean="0">
+                          <a:solidFill>
+                            <a:srgbClr val="000000"/>
+                          </a:solidFill>
+                          <a:latin typeface="Cambria Math" panose="02040503050406030204" pitchFamily="18" charset="0"/>
+                        </a:rPr>
+                        <m:t>12</m:t>
+                      </m:r>
+                    </m:oMath>
+                  </m:oMathPara>
+                </a14:m>
+                <a:endParaRPr lang="en-MY" dirty="0"/>
+              </a:p>
+            </p:txBody>
+          </p:sp>
+        </mc:Choice>
+        <mc:Fallback>
+          <p:sp>
+            <p:nvSpPr>
+              <p:cNvPr id="4" name="Object 3">
+                <a:extLst>
+                  <a:ext uri="{FF2B5EF4-FFF2-40B4-BE49-F238E27FC236}">
+                    <a16:creationId xmlns:a16="http://schemas.microsoft.com/office/drawing/2014/main" id="{D44016CE-DC1B-47E7-9640-79F63DD941DC}"/>
+                  </a:ext>
+                </a:extLst>
+              </p:cNvPr>
+              <p:cNvSpPr txBox="1">
+                <a:spLocks noRot="1" noChangeAspect="1" noMove="1" noResize="1" noEditPoints="1" noAdjustHandles="1" noChangeArrowheads="1" noChangeShapeType="1" noTextEdit="1"/>
+              </p:cNvSpPr>
+              <p:nvPr/>
+            </p:nvSpPr>
+            <p:spPr>
+              <a:xfrm>
+                <a:off x="7753350" y="2192338"/>
+                <a:ext cx="3095092" cy="3983037"/>
+              </a:xfrm>
+              <a:prstGeom prst="rect">
+                <a:avLst/>
+              </a:prstGeom>
+              <a:blipFill>
+                <a:blip r:embed="rId2"/>
+                <a:stretch>
+                  <a:fillRect/>
+                </a:stretch>
+              </a:blipFill>
+            </p:spPr>
+            <p:txBody>
+              <a:bodyPr/>
+              <a:lstStyle/>
+              <a:p>
+                <a:r>
+                  <a:rPr lang="en-MY">
+                    <a:noFill/>
+                  </a:rPr>
+                  <a:t> </a:t>
+                </a:r>
+              </a:p>
+            </p:txBody>
+          </p:sp>
+        </mc:Fallback>
+      </mc:AlternateContent>
     </p:spTree>
   </p:cSld>
   <p:clrMapOvr>
@@ -15641,7 +16325,7 @@
             </a:pPr>
             <a:r>
               <a:rPr lang="en-MY" dirty="0"/>
-              <a:t>Here we have a = 1,800, r = 1 + 3% = 1.03, and n = 2011 – 2002 = 8.</a:t>
+              <a:t>Here we have a = 1,800, r = 1 + 3% = 1.03, and n = 2002 until 2011 = 10 years.</a:t>
             </a:r>
           </a:p>
           <a:p>
@@ -15663,7 +16347,7 @@
             </a:r>
             <a:r>
               <a:rPr lang="en-MY" baseline="-25000" dirty="0"/>
-              <a:t>8</a:t>
+              <a:t>10</a:t>
             </a:r>
             <a:r>
               <a:rPr lang="en-MY" dirty="0"/>
@@ -15675,7 +16359,7 @@
             </a:r>
             <a:r>
               <a:rPr lang="en-MY" baseline="30000" dirty="0"/>
-              <a:t>(8 - 1) </a:t>
+              <a:t>(10 - 1) </a:t>
             </a:r>
             <a:r>
               <a:rPr lang="en-MY" dirty="0"/>
@@ -15683,15 +16367,15 @@
             </a:r>
             <a:r>
               <a:rPr lang="en-MY" baseline="30000" dirty="0"/>
-              <a:t>7</a:t>
+              <a:t>9</a:t>
             </a:r>
             <a:r>
               <a:rPr lang="en-MY" dirty="0"/>
-              <a:t> = </a:t>
+              <a:t>= </a:t>
             </a:r>
             <a:r>
               <a:rPr lang="en-MY" b="1" dirty="0"/>
-              <a:t>RM 2,213.77</a:t>
+              <a:t>RM 2,348.59</a:t>
             </a:r>
           </a:p>
         </p:txBody>
@@ -16979,7 +17663,7 @@
           <a:graphicData uri="http://schemas.openxmlformats.org/presentationml/2006/ole">
             <mc:AlternateContent xmlns:mc="http://schemas.openxmlformats.org/markup-compatibility/2006">
               <mc:Choice xmlns:v="urn:schemas-microsoft-com:vml" Requires="v">
-                <p:oleObj spid="_x0000_s11286" name="Equation" r:id="rId3" imgW="990360" imgH="228600" progId="Equation.3">
+                <p:oleObj spid="_x0000_s11290" name="Equation" r:id="rId3" imgW="990360" imgH="228600" progId="Equation.3">
                   <p:embed/>
                 </p:oleObj>
               </mc:Choice>
@@ -17055,7 +17739,7 @@
           <a:graphicData uri="http://schemas.openxmlformats.org/presentationml/2006/ole">
             <mc:AlternateContent xmlns:mc="http://schemas.openxmlformats.org/markup-compatibility/2006">
               <mc:Choice xmlns:v="urn:schemas-microsoft-com:vml" Requires="v">
-                <p:oleObj spid="_x0000_s11287" name="Equation" r:id="rId5" imgW="1612800" imgH="1143000" progId="Equation.3">
+                <p:oleObj spid="_x0000_s11291" name="Equation" r:id="rId5" imgW="1612800" imgH="1143000" progId="Equation.3">
                   <p:embed/>
                 </p:oleObj>
               </mc:Choice>
@@ -17360,7 +18044,7 @@
           <a:graphicData uri="http://schemas.openxmlformats.org/presentationml/2006/ole">
             <mc:AlternateContent xmlns:mc="http://schemas.openxmlformats.org/markup-compatibility/2006">
               <mc:Choice xmlns:v="urn:schemas-microsoft-com:vml" Requires="v">
-                <p:oleObj spid="_x0000_s16398" name="Equation" r:id="rId3" imgW="990360" imgH="228600" progId="Equation.3">
+                <p:oleObj spid="_x0000_s16402" name="Equation" r:id="rId3" imgW="990360" imgH="228600" progId="Equation.3">
                   <p:embed/>
                 </p:oleObj>
               </mc:Choice>
@@ -17436,7 +18120,7 @@
           <a:graphicData uri="http://schemas.openxmlformats.org/presentationml/2006/ole">
             <mc:AlternateContent xmlns:mc="http://schemas.openxmlformats.org/markup-compatibility/2006">
               <mc:Choice xmlns:v="urn:schemas-microsoft-com:vml" Requires="v">
-                <p:oleObj spid="_x0000_s16399" name="Equation" r:id="rId5" imgW="1815840" imgH="1143000" progId="Equation.3">
+                <p:oleObj spid="_x0000_s16403" name="Equation" r:id="rId5" imgW="1815840" imgH="1143000" progId="Equation.3">
                   <p:embed/>
                 </p:oleObj>
               </mc:Choice>

</xml_diff>